<commit_message>
rajout fichier plan de tests
</commit_message>
<xml_diff>
--- a/presentation p52.pptx
+++ b/presentation p52.pptx
@@ -747,8 +747,8 @@
         </p:nvSpPr>
         <p:spPr>
           <a:xfrm>
-            <a:off x="381000" y="685800"/>
-            <a:ext cx="6096000" cy="3429000"/>
+            <a:off x="381300" y="685800"/>
+            <a:ext cx="6096075" cy="3429000"/>
           </a:xfrm>
           <a:custGeom>
             <a:avLst/>
@@ -15029,7 +15029,7 @@
         <p:spPr>
           <a:xfrm>
             <a:off x="824000" y="279000"/>
-            <a:ext cx="7400700" cy="845712"/>
+            <a:ext cx="7400700" cy="1019100"/>
           </a:xfrm>
           <a:prstGeom prst="rect">
             <a:avLst/>
@@ -15051,10 +15051,10 @@
               <a:buNone/>
             </a:pPr>
             <a:r>
-              <a:rPr lang="fr" dirty="0"/>
-              <a:t>			PROJET 5							</a:t>
+              <a:rPr lang="fr"/>
+              <a:t>PROJET 5							ORINOCO</a:t>
             </a:r>
-            <a:endParaRPr dirty="0"/>
+            <a:endParaRPr/>
           </a:p>
         </p:txBody>
       </p:sp>
@@ -15093,9 +15093,137 @@
               <a:buNone/>
             </a:pPr>
             <a:r>
-              <a:rPr lang="fr" sz="2800" dirty="0"/>
-              <a:t>Réalisation d’un site E-Commerce.</a:t>
+              <a:rPr lang="fr"/>
+              <a:t>			</a:t>
             </a:r>
+            <a:endParaRPr sz="2400"/>
+          </a:p>
+          <a:p>
+            <a:pPr marL="457200" lvl="0" indent="-381000" algn="l" rtl="0">
+              <a:spcBef>
+                <a:spcPts val="0"/>
+              </a:spcBef>
+              <a:spcAft>
+                <a:spcPts val="0"/>
+              </a:spcAft>
+              <a:buSzPts val="2400"/>
+              <a:buChar char="●"/>
+            </a:pPr>
+            <a:r>
+              <a:rPr lang="fr" sz="2400"/>
+              <a:t>Réalisation d’un site E-Commerce</a:t>
+            </a:r>
+            <a:endParaRPr sz="2400"/>
+          </a:p>
+          <a:p>
+            <a:pPr marL="457200" lvl="0" indent="-381000" algn="l" rtl="0">
+              <a:spcBef>
+                <a:spcPts val="0"/>
+              </a:spcBef>
+              <a:spcAft>
+                <a:spcPts val="0"/>
+              </a:spcAft>
+              <a:buSzPts val="2400"/>
+              <a:buChar char="●"/>
+            </a:pPr>
+            <a:r>
+              <a:rPr lang="fr" sz="2400"/>
+              <a:t>A partir d’une API</a:t>
+            </a:r>
+            <a:endParaRPr sz="2400"/>
+          </a:p>
+          <a:p>
+            <a:pPr marL="457200" lvl="0" indent="-381000" algn="l" rtl="0">
+              <a:spcBef>
+                <a:spcPts val="0"/>
+              </a:spcBef>
+              <a:spcAft>
+                <a:spcPts val="0"/>
+              </a:spcAft>
+              <a:buSzPts val="2400"/>
+              <a:buChar char="●"/>
+            </a:pPr>
+            <a:r>
+              <a:rPr lang="fr" sz="2400"/>
+              <a:t>4 pages</a:t>
+            </a:r>
+            <a:endParaRPr sz="2400"/>
+          </a:p>
+          <a:p>
+            <a:pPr marL="457200" lvl="0" indent="0" algn="l" rtl="0">
+              <a:spcBef>
+                <a:spcPts val="0"/>
+              </a:spcBef>
+              <a:spcAft>
+                <a:spcPts val="0"/>
+              </a:spcAft>
+              <a:buNone/>
+            </a:pPr>
+            <a:r>
+              <a:rPr lang="fr" sz="2400"/>
+              <a:t>	*  Page d’accueil</a:t>
+            </a:r>
+            <a:endParaRPr sz="2400"/>
+          </a:p>
+          <a:p>
+            <a:pPr marL="457200" lvl="0" indent="0" algn="l" rtl="0">
+              <a:spcBef>
+                <a:spcPts val="0"/>
+              </a:spcBef>
+              <a:spcAft>
+                <a:spcPts val="0"/>
+              </a:spcAft>
+              <a:buNone/>
+            </a:pPr>
+            <a:r>
+              <a:rPr lang="fr" sz="2400"/>
+              <a:t>	*  Page produit</a:t>
+            </a:r>
+            <a:endParaRPr sz="2400"/>
+          </a:p>
+          <a:p>
+            <a:pPr marL="457200" lvl="0" indent="0" algn="l" rtl="0">
+              <a:spcBef>
+                <a:spcPts val="0"/>
+              </a:spcBef>
+              <a:spcAft>
+                <a:spcPts val="0"/>
+              </a:spcAft>
+              <a:buNone/>
+            </a:pPr>
+            <a:r>
+              <a:rPr lang="fr" sz="2400"/>
+              <a:t>	*  Page panier</a:t>
+            </a:r>
+            <a:endParaRPr sz="2400"/>
+          </a:p>
+          <a:p>
+            <a:pPr marL="457200" lvl="0" indent="0" algn="l" rtl="0">
+              <a:spcBef>
+                <a:spcPts val="0"/>
+              </a:spcBef>
+              <a:spcAft>
+                <a:spcPts val="0"/>
+              </a:spcAft>
+              <a:buNone/>
+            </a:pPr>
+            <a:r>
+              <a:rPr lang="fr" sz="2400"/>
+              <a:t>	*  Page de remerciement</a:t>
+            </a:r>
+            <a:endParaRPr sz="2400"/>
+          </a:p>
+          <a:p>
+            <a:pPr marL="457200" lvl="0" indent="0" algn="l" rtl="0">
+              <a:spcBef>
+                <a:spcPts val="0"/>
+              </a:spcBef>
+              <a:spcAft>
+                <a:spcPts val="0"/>
+              </a:spcAft>
+              <a:buNone/>
+            </a:pPr>
+            <a:endParaRPr sz="2400"/>
           </a:p>
           <a:p>
             <a:pPr marL="0" lvl="0" indent="0" algn="l" rtl="0">
@@ -15107,126 +15235,7 @@
               </a:spcAft>
               <a:buNone/>
             </a:pPr>
-            <a:endParaRPr sz="2400" dirty="0"/>
-          </a:p>
-          <a:p>
-            <a:pPr marL="76200" lvl="0" indent="0" algn="l" rtl="0">
-              <a:spcBef>
-                <a:spcPts val="0"/>
-              </a:spcBef>
-              <a:spcAft>
-                <a:spcPts val="0"/>
-              </a:spcAft>
-              <a:buSzPts val="2400"/>
-            </a:pPr>
-            <a:r>
-              <a:rPr lang="fr" sz="2400" dirty="0"/>
-              <a:t>          *   API en Localhost.</a:t>
-            </a:r>
-          </a:p>
-          <a:p>
-            <a:pPr marL="76200" lvl="0" indent="0" algn="l" rtl="0">
-              <a:spcBef>
-                <a:spcPts val="0"/>
-              </a:spcBef>
-              <a:spcAft>
-                <a:spcPts val="0"/>
-              </a:spcAft>
-              <a:buSzPts val="2400"/>
-            </a:pPr>
-            <a:r>
-              <a:rPr lang="fr" sz="2400" dirty="0"/>
-              <a:t>	*  4 pages.</a:t>
-            </a:r>
-            <a:endParaRPr sz="2400" dirty="0"/>
-          </a:p>
-          <a:p>
-            <a:pPr marL="457200" lvl="0" indent="0" algn="l" rtl="0">
-              <a:spcBef>
-                <a:spcPts val="0"/>
-              </a:spcBef>
-              <a:spcAft>
-                <a:spcPts val="0"/>
-              </a:spcAft>
-              <a:buNone/>
-            </a:pPr>
-            <a:r>
-              <a:rPr lang="fr" sz="2400" dirty="0"/>
-              <a:t>		- Page d’accueil.</a:t>
-            </a:r>
-            <a:endParaRPr sz="2400" dirty="0"/>
-          </a:p>
-          <a:p>
-            <a:pPr marL="457200" lvl="0" indent="0" algn="l" rtl="0">
-              <a:spcBef>
-                <a:spcPts val="0"/>
-              </a:spcBef>
-              <a:spcAft>
-                <a:spcPts val="0"/>
-              </a:spcAft>
-              <a:buNone/>
-            </a:pPr>
-            <a:r>
-              <a:rPr lang="fr" sz="2400" dirty="0"/>
-              <a:t>		- Page produit.</a:t>
-            </a:r>
-            <a:endParaRPr sz="2400" dirty="0"/>
-          </a:p>
-          <a:p>
-            <a:pPr marL="457200" lvl="0" indent="0" algn="l" rtl="0">
-              <a:spcBef>
-                <a:spcPts val="0"/>
-              </a:spcBef>
-              <a:spcAft>
-                <a:spcPts val="0"/>
-              </a:spcAft>
-              <a:buNone/>
-            </a:pPr>
-            <a:r>
-              <a:rPr lang="fr" sz="2400" dirty="0"/>
-              <a:t>		-  Page panier.</a:t>
-            </a:r>
-            <a:endParaRPr sz="2400" dirty="0"/>
-          </a:p>
-          <a:p>
-            <a:pPr marL="457200" lvl="0" indent="0" algn="l" rtl="0">
-              <a:spcBef>
-                <a:spcPts val="0"/>
-              </a:spcBef>
-              <a:spcAft>
-                <a:spcPts val="0"/>
-              </a:spcAft>
-              <a:buNone/>
-            </a:pPr>
-            <a:r>
-              <a:rPr lang="fr" sz="2400" dirty="0"/>
-              <a:t>		- Page de remerciement.</a:t>
-            </a:r>
-            <a:endParaRPr sz="2400" dirty="0"/>
-          </a:p>
-          <a:p>
-            <a:pPr marL="457200" lvl="0" indent="0" algn="l" rtl="0">
-              <a:spcBef>
-                <a:spcPts val="0"/>
-              </a:spcBef>
-              <a:spcAft>
-                <a:spcPts val="0"/>
-              </a:spcAft>
-              <a:buNone/>
-            </a:pPr>
-            <a:endParaRPr sz="2400" dirty="0"/>
-          </a:p>
-          <a:p>
-            <a:pPr marL="0" lvl="0" indent="0" algn="l" rtl="0">
-              <a:spcBef>
-                <a:spcPts val="0"/>
-              </a:spcBef>
-              <a:spcAft>
-                <a:spcPts val="0"/>
-              </a:spcAft>
-              <a:buNone/>
-            </a:pPr>
-            <a:endParaRPr sz="2400" dirty="0"/>
+            <a:endParaRPr sz="2400"/>
           </a:p>
         </p:txBody>
       </p:sp>
@@ -15267,8 +15276,8 @@
         </p:nvSpPr>
         <p:spPr>
           <a:xfrm>
-            <a:off x="824000" y="173737"/>
-            <a:ext cx="7137600" cy="877824"/>
+            <a:off x="824000" y="567925"/>
+            <a:ext cx="7137600" cy="867900"/>
           </a:xfrm>
           <a:prstGeom prst="rect">
             <a:avLst/>
@@ -15290,14 +15299,14 @@
               <a:buNone/>
             </a:pPr>
             <a:r>
-              <a:rPr lang="fr" dirty="0"/>
+              <a:rPr lang="fr"/>
               <a:t>  </a:t>
             </a:r>
             <a:r>
-              <a:rPr lang="fr" sz="3100" dirty="0"/>
+              <a:rPr lang="fr" sz="3100"/>
               <a:t>ÉLÉMENTS CONSTITUTIFS DU SITE</a:t>
             </a:r>
-            <a:endParaRPr sz="3100" dirty="0"/>
+            <a:endParaRPr sz="3100"/>
           </a:p>
         </p:txBody>
       </p:sp>
@@ -15313,8 +15322,8 @@
         </p:nvSpPr>
         <p:spPr>
           <a:xfrm>
-            <a:off x="824000" y="1051561"/>
-            <a:ext cx="6794700" cy="3984739"/>
+            <a:off x="824000" y="1575200"/>
+            <a:ext cx="6794700" cy="3461100"/>
           </a:xfrm>
           <a:prstGeom prst="rect">
             <a:avLst/>
@@ -15340,12 +15349,8 @@
               <a:t> </a:t>
             </a:r>
             <a:r>
-              <a:rPr lang="fr" sz="2400" dirty="0"/>
-              <a:t>Fichiers :</a:t>
-            </a:r>
-            <a:r>
               <a:rPr lang="fr" sz="2000" dirty="0"/>
-              <a:t>  </a:t>
+              <a:t>Fichiers :  </a:t>
             </a:r>
             <a:endParaRPr sz="2000" dirty="0"/>
           </a:p>
@@ -15395,17 +15400,6 @@
               <a:rPr lang="fr" sz="2000" dirty="0"/>
               <a:t>JS</a:t>
             </a:r>
-          </a:p>
-          <a:p>
-            <a:pPr marL="457200" lvl="0" indent="0" algn="l" rtl="0">
-              <a:spcBef>
-                <a:spcPts val="0"/>
-              </a:spcBef>
-              <a:spcAft>
-                <a:spcPts val="0"/>
-              </a:spcAft>
-              <a:buNone/>
-            </a:pPr>
             <a:endParaRPr sz="2000" dirty="0"/>
           </a:p>
           <a:p>
@@ -15420,15 +15414,7 @@
             </a:pPr>
             <a:r>
               <a:rPr lang="fr" sz="2000" dirty="0"/>
-              <a:t> </a:t>
-            </a:r>
-            <a:r>
-              <a:rPr lang="fr" sz="2800" dirty="0"/>
-              <a:t>Fonctionnalités Javascript </a:t>
-            </a:r>
-            <a:r>
-              <a:rPr lang="fr" sz="2000" dirty="0"/>
-              <a:t>:</a:t>
+              <a:t> Fonctionnalités Javascript :</a:t>
             </a:r>
             <a:endParaRPr sz="2000" dirty="0"/>
           </a:p>
@@ -15512,7 +15498,7 @@
             </a:r>
             <a:r>
               <a:rPr lang="fr" sz="2100" dirty="0"/>
-              <a:t> JSON.parse / </a:t>
+              <a:t>JSON.parse / </a:t>
             </a:r>
             <a:r>
               <a:rPr lang="fr" sz="2000" dirty="0"/>
@@ -15884,10 +15870,6 @@
             </a:pPr>
             <a:r>
               <a:rPr lang="fr" sz="2400" dirty="0"/>
-              <a:t> </a:t>
-            </a:r>
-            <a:r>
-              <a:rPr lang="fr" sz="2400" b="1" dirty="0"/>
               <a:t>Améliorations à apporter :</a:t>
             </a:r>
           </a:p>
@@ -15901,25 +15883,13 @@
               </a:spcAft>
               <a:buNone/>
             </a:pPr>
-            <a:endParaRPr lang="fr" sz="2400" b="1" dirty="0"/>
-          </a:p>
-          <a:p>
-            <a:pPr marL="0" lvl="0" indent="0" algn="l" rtl="0">
-              <a:spcBef>
-                <a:spcPts val="0"/>
-              </a:spcBef>
-              <a:spcAft>
-                <a:spcPts val="0"/>
-              </a:spcAft>
-              <a:buNone/>
-            </a:pPr>
             <a:r>
-              <a:rPr lang="fr" sz="2400" b="1" dirty="0"/>
-              <a:t>     * </a:t>
+              <a:rPr lang="fr" sz="2400" dirty="0"/>
+              <a:t>	* </a:t>
             </a:r>
             <a:r>
-              <a:rPr lang="fr" sz="2400" dirty="0"/>
-              <a:t>Rubrique : Avis satisfaction client sur le site.</a:t>
+              <a:rPr lang="fr" sz="1200" dirty="0"/>
+              <a:t>Formulaire : proposition d’envois de courriers informatifs ( promotions et offres)</a:t>
             </a:r>
           </a:p>
           <a:p>
@@ -15932,56 +15902,6 @@
               </a:spcAft>
               <a:buNone/>
             </a:pPr>
-            <a:r>
-              <a:rPr lang="fr" sz="2400" b="1" dirty="0"/>
-              <a:t>     * </a:t>
-            </a:r>
-            <a:r>
-              <a:rPr lang="fr" sz="2400" dirty="0"/>
-              <a:t>Ajout liens vers partenaires.</a:t>
-            </a:r>
-          </a:p>
-          <a:p>
-            <a:pPr marL="0" lvl="0" indent="0" algn="l" rtl="0">
-              <a:spcBef>
-                <a:spcPts val="0"/>
-              </a:spcBef>
-              <a:spcAft>
-                <a:spcPts val="0"/>
-              </a:spcAft>
-              <a:buNone/>
-            </a:pPr>
-            <a:r>
-              <a:rPr lang="fr" sz="2400" b="1" dirty="0"/>
-              <a:t>     * </a:t>
-            </a:r>
-          </a:p>
-          <a:p>
-            <a:pPr marL="0" lvl="0" indent="0" algn="l" rtl="0">
-              <a:spcBef>
-                <a:spcPts val="0"/>
-              </a:spcBef>
-              <a:spcAft>
-                <a:spcPts val="0"/>
-              </a:spcAft>
-              <a:buNone/>
-            </a:pPr>
-            <a:endParaRPr lang="fr" sz="2400" b="1" dirty="0"/>
-          </a:p>
-          <a:p>
-            <a:pPr marL="0" lvl="0" indent="0" algn="l" rtl="0">
-              <a:spcBef>
-                <a:spcPts val="0"/>
-              </a:spcBef>
-              <a:spcAft>
-                <a:spcPts val="0"/>
-              </a:spcAft>
-              <a:buNone/>
-            </a:pPr>
-            <a:r>
-              <a:rPr lang="fr-FR" sz="2400" dirty="0"/>
-              <a:t>	</a:t>
-            </a:r>
             <a:endParaRPr sz="2400" dirty="0"/>
           </a:p>
           <a:p>

</xml_diff>